<commit_message>
chapter 2: circumference ratio explain
</commit_message>
<xml_diff>
--- a/images/rise_flattop_fall.pptx
+++ b/images/rise_flattop_fall.pptx
@@ -4,6 +4,9 @@
   <p:sldMasterIdLst>
     <p:sldMasterId id="2147483648" r:id="rId1"/>
   </p:sldMasterIdLst>
+  <p:notesMasterIdLst>
+    <p:notesMasterId r:id="rId6"/>
+  </p:notesMasterIdLst>
   <p:sldIdLst>
     <p:sldId id="259" r:id="rId3"/>
     <p:sldId id="257" r:id="rId4"/>
@@ -107,6 +110,397 @@
     </a:lvl9pPr>
   </p:defaultTextStyle>
 </p:presentation>
+</file>
+
+<file path=ppt/notesMasters/notesMaster1.xml><?xml version="1.0" encoding="utf-8"?>
+<p:notesMaster xmlns:a="http://schemas.openxmlformats.org/drawingml/2006/main" xmlns:r="http://schemas.openxmlformats.org/officeDocument/2006/relationships" xmlns:p="http://schemas.openxmlformats.org/presentationml/2006/main">
+  <p:cSld>
+    <p:bg>
+      <p:bgRef idx="1001">
+        <a:schemeClr val="bg1"/>
+      </p:bgRef>
+    </p:bg>
+    <p:spTree>
+      <p:nvGrpSpPr>
+        <p:cNvPr id="1" name=""/>
+        <p:cNvGrpSpPr/>
+        <p:nvPr/>
+      </p:nvGrpSpPr>
+      <p:grpSpPr>
+        <a:xfrm>
+          <a:off x="0" y="0"/>
+          <a:ext cx="0" cy="0"/>
+          <a:chOff x="0" y="0"/>
+          <a:chExt cx="0" cy="0"/>
+        </a:xfrm>
+      </p:grpSpPr>
+      <p:sp>
+        <p:nvSpPr>
+          <p:cNvPr id="2" name="页眉占位符 1"/>
+          <p:cNvSpPr>
+            <a:spLocks noGrp="1"/>
+          </p:cNvSpPr>
+          <p:nvPr>
+            <p:ph type="hdr" sz="quarter"/>
+          </p:nvPr>
+        </p:nvSpPr>
+        <p:spPr>
+          <a:xfrm>
+            <a:off x="0" y="0"/>
+            <a:ext cx="3078290" cy="513492"/>
+          </a:xfrm>
+          <a:prstGeom prst="rect">
+            <a:avLst/>
+          </a:prstGeom>
+        </p:spPr>
+        <p:txBody>
+          <a:bodyPr vert="horz" lIns="91440" tIns="45720" rIns="91440" bIns="45720" rtlCol="0"/>
+          <a:lstStyle>
+            <a:lvl1pPr algn="l">
+              <a:defRPr sz="1200"/>
+            </a:lvl1pPr>
+          </a:lstStyle>
+          <a:p>
+            <a:endParaRPr lang="zh-CN" altLang="en-US"/>
+          </a:p>
+        </p:txBody>
+      </p:sp>
+      <p:sp>
+        <p:nvSpPr>
+          <p:cNvPr id="3" name="日期占位符 2"/>
+          <p:cNvSpPr>
+            <a:spLocks noGrp="1"/>
+          </p:cNvSpPr>
+          <p:nvPr>
+            <p:ph type="dt" idx="1"/>
+          </p:nvPr>
+        </p:nvSpPr>
+        <p:spPr>
+          <a:xfrm>
+            <a:off x="4023812" y="0"/>
+            <a:ext cx="3078290" cy="513492"/>
+          </a:xfrm>
+          <a:prstGeom prst="rect">
+            <a:avLst/>
+          </a:prstGeom>
+        </p:spPr>
+        <p:txBody>
+          <a:bodyPr vert="horz" lIns="91440" tIns="45720" rIns="91440" bIns="45720" rtlCol="0"/>
+          <a:lstStyle>
+            <a:lvl1pPr algn="r">
+              <a:defRPr sz="1200"/>
+            </a:lvl1pPr>
+          </a:lstStyle>
+          <a:p>
+            <a:fld id="{D2A48B96-639E-45A3-A0BA-2464DFDB1FAA}" type="datetimeFigureOut">
+              <a:rPr lang="zh-CN" altLang="en-US" smtClean="0"/>
+            </a:fld>
+            <a:endParaRPr lang="zh-CN" altLang="en-US"/>
+          </a:p>
+        </p:txBody>
+      </p:sp>
+      <p:sp>
+        <p:nvSpPr>
+          <p:cNvPr id="4" name="幻灯片图像占位符 3"/>
+          <p:cNvSpPr>
+            <a:spLocks noGrp="1" noRot="1" noChangeAspect="1"/>
+          </p:cNvSpPr>
+          <p:nvPr>
+            <p:ph type="sldImg" idx="2"/>
+          </p:nvPr>
+        </p:nvSpPr>
+        <p:spPr>
+          <a:xfrm>
+            <a:off x="481584" y="1279287"/>
+            <a:ext cx="6140577" cy="3454075"/>
+          </a:xfrm>
+          <a:prstGeom prst="rect">
+            <a:avLst/>
+          </a:prstGeom>
+          <a:noFill/>
+          <a:ln w="12700">
+            <a:solidFill>
+              <a:prstClr val="black"/>
+            </a:solidFill>
+          </a:ln>
+        </p:spPr>
+        <p:txBody>
+          <a:bodyPr vert="horz" lIns="91440" tIns="45720" rIns="91440" bIns="45720" rtlCol="0" anchor="ctr"/>
+          <a:lstStyle/>
+          <a:p>
+            <a:endParaRPr lang="zh-CN" altLang="en-US"/>
+          </a:p>
+        </p:txBody>
+      </p:sp>
+      <p:sp>
+        <p:nvSpPr>
+          <p:cNvPr id="5" name="备注占位符 4"/>
+          <p:cNvSpPr>
+            <a:spLocks noGrp="1"/>
+          </p:cNvSpPr>
+          <p:nvPr>
+            <p:ph type="body" sz="quarter" idx="3"/>
+          </p:nvPr>
+        </p:nvSpPr>
+        <p:spPr>
+          <a:xfrm>
+            <a:off x="710375" y="4925254"/>
+            <a:ext cx="5682996" cy="4029754"/>
+          </a:xfrm>
+          <a:prstGeom prst="rect">
+            <a:avLst/>
+          </a:prstGeom>
+        </p:spPr>
+        <p:txBody>
+          <a:bodyPr vert="horz" lIns="91440" tIns="45720" rIns="91440" bIns="45720" rtlCol="0"/>
+          <a:lstStyle/>
+          <a:p>
+            <a:pPr lvl="0"/>
+            <a:r>
+              <a:rPr lang="zh-CN" altLang="en-US" smtClean="0"/>
+              <a:t>单击此处编辑母版文本样式</a:t>
+            </a:r>
+            <a:endParaRPr lang="zh-CN" altLang="en-US" smtClean="0"/>
+          </a:p>
+          <a:p>
+            <a:pPr lvl="1"/>
+            <a:r>
+              <a:rPr lang="zh-CN" altLang="en-US" smtClean="0"/>
+              <a:t>第二级</a:t>
+            </a:r>
+            <a:endParaRPr lang="zh-CN" altLang="en-US" smtClean="0"/>
+          </a:p>
+          <a:p>
+            <a:pPr lvl="2"/>
+            <a:r>
+              <a:rPr lang="zh-CN" altLang="en-US" smtClean="0"/>
+              <a:t>第三级</a:t>
+            </a:r>
+            <a:endParaRPr lang="zh-CN" altLang="en-US" smtClean="0"/>
+          </a:p>
+          <a:p>
+            <a:pPr lvl="3"/>
+            <a:r>
+              <a:rPr lang="zh-CN" altLang="en-US" smtClean="0"/>
+              <a:t>第四级</a:t>
+            </a:r>
+            <a:endParaRPr lang="zh-CN" altLang="en-US" smtClean="0"/>
+          </a:p>
+          <a:p>
+            <a:pPr lvl="4"/>
+            <a:r>
+              <a:rPr lang="zh-CN" altLang="en-US" smtClean="0"/>
+              <a:t>第五级</a:t>
+            </a:r>
+            <a:endParaRPr lang="zh-CN" altLang="en-US"/>
+          </a:p>
+        </p:txBody>
+      </p:sp>
+      <p:sp>
+        <p:nvSpPr>
+          <p:cNvPr id="6" name="页脚占位符 5"/>
+          <p:cNvSpPr>
+            <a:spLocks noGrp="1"/>
+          </p:cNvSpPr>
+          <p:nvPr>
+            <p:ph type="ftr" sz="quarter" idx="4"/>
+          </p:nvPr>
+        </p:nvSpPr>
+        <p:spPr>
+          <a:xfrm>
+            <a:off x="0" y="9720804"/>
+            <a:ext cx="3078290" cy="513491"/>
+          </a:xfrm>
+          <a:prstGeom prst="rect">
+            <a:avLst/>
+          </a:prstGeom>
+        </p:spPr>
+        <p:txBody>
+          <a:bodyPr vert="horz" lIns="91440" tIns="45720" rIns="91440" bIns="45720" rtlCol="0" anchor="b"/>
+          <a:lstStyle>
+            <a:lvl1pPr algn="l">
+              <a:defRPr sz="1200"/>
+            </a:lvl1pPr>
+          </a:lstStyle>
+          <a:p>
+            <a:endParaRPr lang="zh-CN" altLang="en-US"/>
+          </a:p>
+        </p:txBody>
+      </p:sp>
+      <p:sp>
+        <p:nvSpPr>
+          <p:cNvPr id="7" name="灯片编号占位符 6"/>
+          <p:cNvSpPr>
+            <a:spLocks noGrp="1"/>
+          </p:cNvSpPr>
+          <p:nvPr>
+            <p:ph type="sldNum" sz="quarter" idx="5"/>
+          </p:nvPr>
+        </p:nvSpPr>
+        <p:spPr>
+          <a:xfrm>
+            <a:off x="4023812" y="9720804"/>
+            <a:ext cx="3078290" cy="513491"/>
+          </a:xfrm>
+          <a:prstGeom prst="rect">
+            <a:avLst/>
+          </a:prstGeom>
+        </p:spPr>
+        <p:txBody>
+          <a:bodyPr vert="horz" lIns="91440" tIns="45720" rIns="91440" bIns="45720" rtlCol="0" anchor="b"/>
+          <a:lstStyle>
+            <a:lvl1pPr algn="r">
+              <a:defRPr sz="1200"/>
+            </a:lvl1pPr>
+          </a:lstStyle>
+          <a:p>
+            <a:fld id="{A6837353-30EB-4A48-80EB-173D804AEFBD}" type="slidenum">
+              <a:rPr lang="zh-CN" altLang="en-US" smtClean="0"/>
+            </a:fld>
+            <a:endParaRPr lang="zh-CN" altLang="en-US"/>
+          </a:p>
+        </p:txBody>
+      </p:sp>
+    </p:spTree>
+  </p:cSld>
+  <p:clrMap bg1="lt1" tx1="dk1" bg2="lt2" tx2="dk2" accent1="accent1" accent2="accent2" accent3="accent3" accent4="accent4" accent5="accent5" accent6="accent6" hlink="hlink" folHlink="folHlink"/>
+  <p:notesStyle>
+    <a:lvl1pPr marL="0" algn="l" defTabSz="914400" rtl="0" eaLnBrk="1" latinLnBrk="0" hangingPunct="1">
+      <a:defRPr sz="1200" kern="1200">
+        <a:solidFill>
+          <a:schemeClr val="tx1"/>
+        </a:solidFill>
+        <a:latin typeface="+mn-lt"/>
+        <a:ea typeface="+mn-ea"/>
+        <a:cs typeface="+mn-cs"/>
+      </a:defRPr>
+    </a:lvl1pPr>
+    <a:lvl2pPr marL="457200" algn="l" defTabSz="914400" rtl="0" eaLnBrk="1" latinLnBrk="0" hangingPunct="1">
+      <a:defRPr sz="1200" kern="1200">
+        <a:solidFill>
+          <a:schemeClr val="tx1"/>
+        </a:solidFill>
+        <a:latin typeface="+mn-lt"/>
+        <a:ea typeface="+mn-ea"/>
+        <a:cs typeface="+mn-cs"/>
+      </a:defRPr>
+    </a:lvl2pPr>
+    <a:lvl3pPr marL="914400" algn="l" defTabSz="914400" rtl="0" eaLnBrk="1" latinLnBrk="0" hangingPunct="1">
+      <a:defRPr sz="1200" kern="1200">
+        <a:solidFill>
+          <a:schemeClr val="tx1"/>
+        </a:solidFill>
+        <a:latin typeface="+mn-lt"/>
+        <a:ea typeface="+mn-ea"/>
+        <a:cs typeface="+mn-cs"/>
+      </a:defRPr>
+    </a:lvl3pPr>
+    <a:lvl4pPr marL="1371600" algn="l" defTabSz="914400" rtl="0" eaLnBrk="1" latinLnBrk="0" hangingPunct="1">
+      <a:defRPr sz="1200" kern="1200">
+        <a:solidFill>
+          <a:schemeClr val="tx1"/>
+        </a:solidFill>
+        <a:latin typeface="+mn-lt"/>
+        <a:ea typeface="+mn-ea"/>
+        <a:cs typeface="+mn-cs"/>
+      </a:defRPr>
+    </a:lvl4pPr>
+    <a:lvl5pPr marL="1828800" algn="l" defTabSz="914400" rtl="0" eaLnBrk="1" latinLnBrk="0" hangingPunct="1">
+      <a:defRPr sz="1200" kern="1200">
+        <a:solidFill>
+          <a:schemeClr val="tx1"/>
+        </a:solidFill>
+        <a:latin typeface="+mn-lt"/>
+        <a:ea typeface="+mn-ea"/>
+        <a:cs typeface="+mn-cs"/>
+      </a:defRPr>
+    </a:lvl5pPr>
+    <a:lvl6pPr marL="2286000" algn="l" defTabSz="914400" rtl="0" eaLnBrk="1" latinLnBrk="0" hangingPunct="1">
+      <a:defRPr sz="1200" kern="1200">
+        <a:solidFill>
+          <a:schemeClr val="tx1"/>
+        </a:solidFill>
+        <a:latin typeface="+mn-lt"/>
+        <a:ea typeface="+mn-ea"/>
+        <a:cs typeface="+mn-cs"/>
+      </a:defRPr>
+    </a:lvl6pPr>
+    <a:lvl7pPr marL="2743200" algn="l" defTabSz="914400" rtl="0" eaLnBrk="1" latinLnBrk="0" hangingPunct="1">
+      <a:defRPr sz="1200" kern="1200">
+        <a:solidFill>
+          <a:schemeClr val="tx1"/>
+        </a:solidFill>
+        <a:latin typeface="+mn-lt"/>
+        <a:ea typeface="+mn-ea"/>
+        <a:cs typeface="+mn-cs"/>
+      </a:defRPr>
+    </a:lvl7pPr>
+    <a:lvl8pPr marL="3200400" algn="l" defTabSz="914400" rtl="0" eaLnBrk="1" latinLnBrk="0" hangingPunct="1">
+      <a:defRPr sz="1200" kern="1200">
+        <a:solidFill>
+          <a:schemeClr val="tx1"/>
+        </a:solidFill>
+        <a:latin typeface="+mn-lt"/>
+        <a:ea typeface="+mn-ea"/>
+        <a:cs typeface="+mn-cs"/>
+      </a:defRPr>
+    </a:lvl8pPr>
+    <a:lvl9pPr marL="3657600" algn="l" defTabSz="914400" rtl="0" eaLnBrk="1" latinLnBrk="0" hangingPunct="1">
+      <a:defRPr sz="1200" kern="1200">
+        <a:solidFill>
+          <a:schemeClr val="tx1"/>
+        </a:solidFill>
+        <a:latin typeface="+mn-lt"/>
+        <a:ea typeface="+mn-ea"/>
+        <a:cs typeface="+mn-cs"/>
+      </a:defRPr>
+    </a:lvl9pPr>
+  </p:notesStyle>
+</p:notesMaster>
+</file>
+
+<file path=ppt/notesSlides/notesSlide1.xml><?xml version="1.0" encoding="utf-8"?>
+<p:notes xmlns:a="http://schemas.openxmlformats.org/drawingml/2006/main" xmlns:r="http://schemas.openxmlformats.org/officeDocument/2006/relationships" xmlns:p="http://schemas.openxmlformats.org/presentationml/2006/main">
+  <p:cSld>
+    <p:spTree>
+      <p:nvGrpSpPr>
+        <p:cNvPr id="1" name=""/>
+        <p:cNvGrpSpPr/>
+        <p:nvPr/>
+      </p:nvGrpSpPr>
+      <p:grpSpPr/>
+      <p:sp>
+        <p:nvSpPr>
+          <p:cNvPr id="2" name="幻灯片图像占位符 1"/>
+          <p:cNvSpPr/>
+          <p:nvPr>
+            <p:ph type="sldImg" idx="2"/>
+          </p:nvPr>
+        </p:nvSpPr>
+        <p:spPr/>
+      </p:sp>
+      <p:sp>
+        <p:nvSpPr>
+          <p:cNvPr id="3" name="文本占位符 2"/>
+          <p:cNvSpPr/>
+          <p:nvPr>
+            <p:ph type="body" idx="3"/>
+          </p:nvPr>
+        </p:nvSpPr>
+        <p:spPr/>
+        <p:txBody>
+          <a:bodyPr/>
+          <a:p>
+            <a:endParaRPr lang="zh-CN" altLang="en-US"/>
+          </a:p>
+        </p:txBody>
+      </p:sp>
+    </p:spTree>
+  </p:cSld>
+  <p:clrMapOvr>
+    <a:masterClrMapping/>
+  </p:clrMapOvr>
+</p:notes>
 </file>
 
 <file path=ppt/slideLayouts/slideLayout1.xml><?xml version="1.0" encoding="utf-8"?>
@@ -2756,8 +3150,8 @@
         </p:nvCxnSpPr>
         <p:spPr>
           <a:xfrm flipH="1">
-            <a:off x="1183271" y="9578046"/>
-            <a:ext cx="9120979" cy="24769"/>
+            <a:off x="223520" y="9776460"/>
+            <a:ext cx="10852785" cy="30480"/>
           </a:xfrm>
           <a:prstGeom prst="straightConnector1">
             <a:avLst/>
@@ -2790,7 +3184,7 @@
         </p:nvCxnSpPr>
         <p:spPr>
           <a:xfrm flipV="1">
-            <a:off x="1429698" y="8255724"/>
+            <a:off x="432113" y="8165554"/>
             <a:ext cx="20959" cy="1667193"/>
           </a:xfrm>
           <a:prstGeom prst="straightConnector1">
@@ -2823,7 +3217,7 @@
         </p:nvCxnSpPr>
         <p:spPr>
           <a:xfrm flipV="1">
-            <a:off x="1996877" y="8538435"/>
+            <a:off x="2769037" y="8736555"/>
             <a:ext cx="1256275" cy="1040967"/>
           </a:xfrm>
           <a:prstGeom prst="line">
@@ -2853,7 +3247,7 @@
         </p:nvCxnSpPr>
         <p:spPr>
           <a:xfrm flipH="1">
-            <a:off x="3252780" y="8518041"/>
+            <a:off x="4024940" y="8716161"/>
             <a:ext cx="4303795" cy="33024"/>
           </a:xfrm>
           <a:prstGeom prst="line">
@@ -2883,7 +3277,7 @@
         </p:nvSpPr>
         <p:spPr>
           <a:xfrm>
-            <a:off x="1931223" y="7305713"/>
+            <a:off x="2703383" y="7503833"/>
             <a:ext cx="1884219" cy="822960"/>
           </a:xfrm>
           <a:prstGeom prst="rect">
@@ -2917,7 +3311,7 @@
         </p:nvCxnSpPr>
         <p:spPr>
           <a:xfrm>
-            <a:off x="1983932" y="8268462"/>
+            <a:off x="2756092" y="8466582"/>
             <a:ext cx="1322192" cy="6985"/>
           </a:xfrm>
           <a:prstGeom prst="straightConnector1">
@@ -2984,7 +3378,7 @@
         </p:nvSpPr>
         <p:spPr>
           <a:xfrm>
-            <a:off x="962885" y="8081065"/>
+            <a:off x="120240" y="7850560"/>
             <a:ext cx="487774" cy="457200"/>
           </a:xfrm>
           <a:prstGeom prst="rect">
@@ -3420,7 +3814,7 @@
         </p:nvCxnSpPr>
         <p:spPr>
           <a:xfrm flipH="1" flipV="1">
-            <a:off x="7573720" y="8518041"/>
+            <a:off x="8345880" y="8716161"/>
             <a:ext cx="2491972" cy="1059913"/>
           </a:xfrm>
           <a:prstGeom prst="line">
@@ -3474,7 +3868,7 @@
         </p:nvCxnSpPr>
         <p:spPr>
           <a:xfrm>
-            <a:off x="3304571" y="8128732"/>
+            <a:off x="4076731" y="8326852"/>
             <a:ext cx="0" cy="1522387"/>
           </a:xfrm>
           <a:prstGeom prst="line">
@@ -3507,7 +3901,7 @@
         </p:nvCxnSpPr>
         <p:spPr>
           <a:xfrm flipH="1">
-            <a:off x="1996634" y="8032220"/>
+            <a:off x="2768794" y="8230340"/>
             <a:ext cx="6350" cy="1538747"/>
           </a:xfrm>
           <a:prstGeom prst="line">
@@ -3562,9 +3956,16 @@
                 <a:latin typeface="Arial" panose="020B0604020202020204" pitchFamily="34" charset="0"/>
                 <a:ea typeface="AR PL KaitiM GB" charset="0"/>
               </a:rPr>
-              <a:t>t0</a:t>
-            </a:r>
-            <a:endParaRPr lang="en-US" altLang="zh-CN" sz="2400">
+              <a:t>t</a:t>
+            </a:r>
+            <a:r>
+              <a:rPr lang="en-US" altLang="zh-CN" sz="2400" baseline="-25000">
+                <a:latin typeface="Arial" panose="020B0604020202020204" pitchFamily="34" charset="0"/>
+                <a:ea typeface="AR PL KaitiM GB" charset="0"/>
+              </a:rPr>
+              <a:t>0</a:t>
+            </a:r>
+            <a:endParaRPr lang="en-US" altLang="zh-CN" sz="2400" baseline="-25000">
               <a:latin typeface="Arial" panose="020B0604020202020204" pitchFamily="34" charset="0"/>
               <a:ea typeface="AR PL KaitiM GB" charset="0"/>
             </a:endParaRPr>
@@ -3977,9 +4378,16 @@
                 <a:latin typeface="Arial" panose="020B0604020202020204" pitchFamily="34" charset="0"/>
                 <a:ea typeface="AR PL KaitiM GB" charset="0"/>
               </a:rPr>
-              <a:t>t1</a:t>
-            </a:r>
-            <a:endParaRPr lang="en-US" altLang="zh-CN" sz="2400">
+              <a:t>t</a:t>
+            </a:r>
+            <a:r>
+              <a:rPr lang="en-US" altLang="zh-CN" sz="2400" baseline="-25000">
+                <a:latin typeface="Arial" panose="020B0604020202020204" pitchFamily="34" charset="0"/>
+                <a:ea typeface="AR PL KaitiM GB" charset="0"/>
+              </a:rPr>
+              <a:t>1</a:t>
+            </a:r>
+            <a:endParaRPr lang="en-US" altLang="zh-CN" sz="2400" baseline="-25000">
               <a:latin typeface="Arial" panose="020B0604020202020204" pitchFamily="34" charset="0"/>
               <a:ea typeface="AR PL KaitiM GB" charset="0"/>
             </a:endParaRPr>
@@ -4153,9 +4561,16 @@
                 <a:latin typeface="Arial" panose="020B0604020202020204" pitchFamily="34" charset="0"/>
                 <a:ea typeface="AR PL KaitiM GB" charset="0"/>
               </a:rPr>
-              <a:t>t2</a:t>
-            </a:r>
-            <a:endParaRPr lang="en-US" altLang="zh-CN" sz="2400">
+              <a:t>t</a:t>
+            </a:r>
+            <a:r>
+              <a:rPr lang="en-US" altLang="zh-CN" sz="2400" baseline="-25000">
+                <a:latin typeface="Arial" panose="020B0604020202020204" pitchFamily="34" charset="0"/>
+                <a:ea typeface="AR PL KaitiM GB" charset="0"/>
+              </a:rPr>
+              <a:t>2</a:t>
+            </a:r>
+            <a:endParaRPr lang="en-US" altLang="zh-CN" sz="2400" baseline="-25000">
               <a:latin typeface="Arial" panose="020B0604020202020204" pitchFamily="34" charset="0"/>
               <a:ea typeface="AR PL KaitiM GB" charset="0"/>
             </a:endParaRPr>
@@ -4313,7 +4728,7 @@
         </p:nvSpPr>
         <p:spPr>
           <a:xfrm>
-            <a:off x="1846125" y="9609706"/>
+            <a:off x="2618285" y="9807826"/>
             <a:ext cx="563932" cy="457200"/>
           </a:xfrm>
           <a:prstGeom prst="rect">
@@ -4335,9 +4750,16 @@
                 <a:latin typeface="Arial" panose="020B0604020202020204" pitchFamily="34" charset="0"/>
                 <a:ea typeface="AR PL KaitiM GB" charset="0"/>
               </a:rPr>
-              <a:t>t0</a:t>
-            </a:r>
-            <a:endParaRPr lang="en-US" altLang="zh-CN" sz="2400">
+              <a:t>t</a:t>
+            </a:r>
+            <a:r>
+              <a:rPr lang="en-US" altLang="zh-CN" sz="2400" baseline="-25000">
+                <a:latin typeface="Arial" panose="020B0604020202020204" pitchFamily="34" charset="0"/>
+                <a:ea typeface="AR PL KaitiM GB" charset="0"/>
+              </a:rPr>
+              <a:t>0</a:t>
+            </a:r>
+            <a:endParaRPr lang="en-US" altLang="zh-CN" sz="2400" baseline="-25000">
               <a:latin typeface="Arial" panose="020B0604020202020204" pitchFamily="34" charset="0"/>
               <a:ea typeface="AR PL KaitiM GB" charset="0"/>
             </a:endParaRPr>
@@ -4352,7 +4774,7 @@
         </p:nvSpPr>
         <p:spPr>
           <a:xfrm>
-            <a:off x="3269292" y="9602721"/>
+            <a:off x="4041452" y="9800841"/>
             <a:ext cx="563932" cy="457200"/>
           </a:xfrm>
           <a:prstGeom prst="rect">
@@ -4374,9 +4796,16 @@
                 <a:latin typeface="Arial" panose="020B0604020202020204" pitchFamily="34" charset="0"/>
                 <a:ea typeface="AR PL KaitiM GB" charset="0"/>
               </a:rPr>
-              <a:t>t1</a:t>
-            </a:r>
-            <a:endParaRPr lang="en-US" altLang="zh-CN" sz="2400">
+              <a:t>t</a:t>
+            </a:r>
+            <a:r>
+              <a:rPr lang="en-US" altLang="zh-CN" sz="2400" baseline="-25000">
+                <a:latin typeface="Arial" panose="020B0604020202020204" pitchFamily="34" charset="0"/>
+                <a:ea typeface="AR PL KaitiM GB" charset="0"/>
+              </a:rPr>
+              <a:t>1</a:t>
+            </a:r>
+            <a:endParaRPr lang="en-US" altLang="zh-CN" sz="2400" baseline="-25000">
               <a:latin typeface="Arial" panose="020B0604020202020204" pitchFamily="34" charset="0"/>
               <a:ea typeface="AR PL KaitiM GB" charset="0"/>
             </a:endParaRPr>
@@ -4391,7 +4820,7 @@
         </p:nvCxnSpPr>
         <p:spPr>
           <a:xfrm>
-            <a:off x="7485164" y="8056969"/>
+            <a:off x="8257324" y="8255089"/>
             <a:ext cx="0" cy="1522387"/>
           </a:xfrm>
           <a:prstGeom prst="line">
@@ -4557,7 +4986,7 @@
         </p:nvSpPr>
         <p:spPr>
           <a:xfrm>
-            <a:off x="3815442" y="7574978"/>
+            <a:off x="4587602" y="7773098"/>
             <a:ext cx="3689057" cy="457200"/>
           </a:xfrm>
           <a:prstGeom prst="rect">
@@ -4591,7 +5020,7 @@
         </p:nvCxnSpPr>
         <p:spPr>
           <a:xfrm flipV="1">
-            <a:off x="3386777" y="8243060"/>
+            <a:off x="4158937" y="8441180"/>
             <a:ext cx="4064378" cy="15877"/>
           </a:xfrm>
           <a:prstGeom prst="straightConnector1">
@@ -4625,7 +5054,7 @@
         </p:nvSpPr>
         <p:spPr>
           <a:xfrm>
-            <a:off x="7187604" y="9650985"/>
+            <a:off x="7959764" y="9849105"/>
             <a:ext cx="610926" cy="457200"/>
           </a:xfrm>
           <a:prstGeom prst="rect">
@@ -4647,9 +5076,16 @@
                 <a:latin typeface="Arial" panose="020B0604020202020204" pitchFamily="34" charset="0"/>
                 <a:ea typeface="AR PL KaitiM GB" charset="0"/>
               </a:rPr>
-              <a:t>t2</a:t>
-            </a:r>
-            <a:endParaRPr lang="en-US" altLang="zh-CN" sz="2400">
+              <a:t>t</a:t>
+            </a:r>
+            <a:r>
+              <a:rPr lang="en-US" altLang="zh-CN" sz="2400" baseline="-25000">
+                <a:latin typeface="Arial" panose="020B0604020202020204" pitchFamily="34" charset="0"/>
+                <a:ea typeface="AR PL KaitiM GB" charset="0"/>
+              </a:rPr>
+              <a:t>2</a:t>
+            </a:r>
+            <a:endParaRPr lang="en-US" altLang="zh-CN" sz="2400" baseline="-25000">
               <a:latin typeface="Arial" panose="020B0604020202020204" pitchFamily="34" charset="0"/>
               <a:ea typeface="AR PL KaitiM GB" charset="0"/>
             </a:endParaRPr>
@@ -4664,7 +5100,7 @@
         </p:nvSpPr>
         <p:spPr>
           <a:xfrm>
-            <a:off x="7602934" y="7671507"/>
+            <a:off x="8375094" y="7869627"/>
             <a:ext cx="3689057" cy="457200"/>
           </a:xfrm>
           <a:prstGeom prst="rect">
@@ -4698,7 +5134,7 @@
         </p:nvCxnSpPr>
         <p:spPr>
           <a:xfrm>
-            <a:off x="10058072" y="8178284"/>
+            <a:off x="10830232" y="8376404"/>
             <a:ext cx="7620" cy="1672111"/>
           </a:xfrm>
           <a:prstGeom prst="line">
@@ -4731,7 +5167,7 @@
         </p:nvCxnSpPr>
         <p:spPr>
           <a:xfrm>
-            <a:off x="7529266" y="8291324"/>
+            <a:off x="8301426" y="8489444"/>
             <a:ext cx="2528804" cy="0"/>
           </a:xfrm>
           <a:prstGeom prst="straightConnector1">
@@ -4916,6 +5352,154 @@
           </a:p>
         </p:txBody>
       </p:sp>
+      <p:sp>
+        <p:nvSpPr>
+          <p:cNvPr id="6" name="闪电形 5"/>
+          <p:cNvSpPr/>
+          <p:nvPr/>
+        </p:nvSpPr>
+        <p:spPr>
+          <a:xfrm>
+            <a:off x="469265" y="7734935"/>
+            <a:ext cx="640715" cy="1995170"/>
+          </a:xfrm>
+          <a:prstGeom prst="lightningBolt">
+            <a:avLst/>
+          </a:prstGeom>
+          <a:solidFill>
+            <a:srgbClr val="FF0000"/>
+          </a:solidFill>
+          <a:ln>
+            <a:solidFill>
+              <a:srgbClr val="FF0000"/>
+            </a:solidFill>
+          </a:ln>
+        </p:spPr>
+        <p:style>
+          <a:lnRef idx="2">
+            <a:schemeClr val="accent1">
+              <a:shade val="50000"/>
+            </a:schemeClr>
+          </a:lnRef>
+          <a:fillRef idx="1">
+            <a:schemeClr val="accent1"/>
+          </a:fillRef>
+          <a:effectRef idx="0">
+            <a:schemeClr val="accent1"/>
+          </a:effectRef>
+          <a:fontRef idx="minor">
+            <a:schemeClr val="lt1"/>
+          </a:fontRef>
+        </p:style>
+        <p:txBody>
+          <a:bodyPr rtlCol="0" anchor="ctr"/>
+          <a:p>
+            <a:pPr algn="ctr"/>
+            <a:endParaRPr lang="zh-CN" altLang="en-US"/>
+          </a:p>
+        </p:txBody>
+      </p:sp>
+      <p:cxnSp>
+        <p:nvCxnSpPr>
+          <p:cNvPr id="7" name="直接箭头连接符 6"/>
+          <p:cNvCxnSpPr/>
+          <p:nvPr/>
+        </p:nvCxnSpPr>
+        <p:spPr>
+          <a:xfrm>
+            <a:off x="1109980" y="8930640"/>
+            <a:ext cx="1677035" cy="22225"/>
+          </a:xfrm>
+          <a:prstGeom prst="straightConnector1">
+            <a:avLst/>
+          </a:prstGeom>
+          <a:ln>
+            <a:headEnd type="arrow" w="med" len="med"/>
+            <a:tailEnd type="arrow" w="med" len="med"/>
+          </a:ln>
+        </p:spPr>
+        <p:style>
+          <a:lnRef idx="1">
+            <a:schemeClr val="dk1"/>
+          </a:lnRef>
+          <a:fillRef idx="0">
+            <a:schemeClr val="dk1"/>
+          </a:fillRef>
+          <a:effectRef idx="0">
+            <a:schemeClr val="dk1"/>
+          </a:effectRef>
+          <a:fontRef idx="minor">
+            <a:schemeClr val="tx1"/>
+          </a:fontRef>
+        </p:style>
+      </p:cxnSp>
+      <p:sp>
+        <p:nvSpPr>
+          <p:cNvPr id="8" name="文本框 7"/>
+          <p:cNvSpPr txBox="1"/>
+          <p:nvPr/>
+        </p:nvSpPr>
+        <p:spPr>
+          <a:xfrm>
+            <a:off x="1081593" y="8107718"/>
+            <a:ext cx="1884219" cy="822960"/>
+          </a:xfrm>
+          <a:prstGeom prst="rect">
+            <a:avLst/>
+          </a:prstGeom>
+          <a:noFill/>
+        </p:spPr>
+        <p:txBody>
+          <a:bodyPr wrap="square" rtlCol="0">
+            <a:spAutoFit/>
+          </a:bodyPr>
+          <a:p>
+            <a:pPr algn="l"/>
+            <a:r>
+              <a:rPr lang="en-US" altLang="zh-CN" sz="2400">
+                <a:latin typeface="Arial" panose="020B0604020202020204" pitchFamily="34" charset="0"/>
+              </a:rPr>
+              <a:t>preparation time</a:t>
+            </a:r>
+            <a:endParaRPr lang="en-US" altLang="zh-CN" sz="2400">
+              <a:latin typeface="Arial" panose="020B0604020202020204" pitchFamily="34" charset="0"/>
+            </a:endParaRPr>
+          </a:p>
+        </p:txBody>
+      </p:sp>
+      <p:cxnSp>
+        <p:nvCxnSpPr>
+          <p:cNvPr id="9" name="直接连接符 8"/>
+          <p:cNvCxnSpPr/>
+          <p:nvPr/>
+        </p:nvCxnSpPr>
+        <p:spPr>
+          <a:xfrm flipH="1">
+            <a:off x="1110174" y="8376390"/>
+            <a:ext cx="6350" cy="1538747"/>
+          </a:xfrm>
+          <a:prstGeom prst="line">
+            <a:avLst/>
+          </a:prstGeom>
+          <a:ln>
+            <a:prstDash val="sysDot"/>
+          </a:ln>
+        </p:spPr>
+        <p:style>
+          <a:lnRef idx="3">
+            <a:schemeClr val="dk1"/>
+          </a:lnRef>
+          <a:fillRef idx="0">
+            <a:schemeClr val="dk1"/>
+          </a:fillRef>
+          <a:effectRef idx="2">
+            <a:schemeClr val="dk1"/>
+          </a:effectRef>
+          <a:fontRef idx="minor">
+            <a:schemeClr val="tx1"/>
+          </a:fontRef>
+        </p:style>
+      </p:cxnSp>
     </p:spTree>
   </p:cSld>
   <p:clrMapOvr>
@@ -6108,9 +6692,9 @@
           <p:nvPr/>
         </p:nvCxnSpPr>
         <p:spPr>
-          <a:xfrm flipH="1">
-            <a:off x="1306195" y="10409555"/>
-            <a:ext cx="10510520" cy="3175"/>
+          <a:xfrm flipH="1" flipV="1">
+            <a:off x="230505" y="10409555"/>
+            <a:ext cx="11620500" cy="19050"/>
           </a:xfrm>
           <a:prstGeom prst="straightConnector1">
             <a:avLst/>
@@ -6142,9 +6726,9 @@
           <p:nvPr/>
         </p:nvCxnSpPr>
         <p:spPr>
-          <a:xfrm flipV="1">
-            <a:off x="1552889" y="9065348"/>
-            <a:ext cx="20959" cy="1667194"/>
+          <a:xfrm flipH="1" flipV="1">
+            <a:off x="292735" y="8938260"/>
+            <a:ext cx="34925" cy="1684655"/>
           </a:xfrm>
           <a:prstGeom prst="straightConnector1">
             <a:avLst/>
@@ -6176,7 +6760,7 @@
         </p:nvCxnSpPr>
         <p:spPr>
           <a:xfrm flipV="1">
-            <a:off x="2120066" y="9348059"/>
+            <a:off x="3119556" y="9348059"/>
             <a:ext cx="1256276" cy="1040968"/>
           </a:xfrm>
           <a:prstGeom prst="line">
@@ -6206,7 +6790,7 @@
         </p:nvCxnSpPr>
         <p:spPr>
           <a:xfrm flipH="1">
-            <a:off x="3375970" y="9327665"/>
+            <a:off x="4375460" y="9327665"/>
             <a:ext cx="4303794" cy="33023"/>
           </a:xfrm>
           <a:prstGeom prst="line">
@@ -6236,7 +6820,7 @@
         </p:nvSpPr>
         <p:spPr>
           <a:xfrm>
-            <a:off x="2054412" y="8115338"/>
+            <a:off x="3053902" y="8115338"/>
             <a:ext cx="1884220" cy="822960"/>
           </a:xfrm>
           <a:prstGeom prst="rect">
@@ -6282,7 +6866,7 @@
         </p:nvCxnSpPr>
         <p:spPr>
           <a:xfrm>
-            <a:off x="2107122" y="9078087"/>
+            <a:off x="3106612" y="9078087"/>
             <a:ext cx="1322193" cy="6986"/>
           </a:xfrm>
           <a:prstGeom prst="straightConnector1">
@@ -6349,7 +6933,7 @@
         </p:nvSpPr>
         <p:spPr>
           <a:xfrm>
-            <a:off x="1086074" y="8890690"/>
+            <a:off x="147544" y="8481115"/>
             <a:ext cx="487773" cy="457200"/>
           </a:xfrm>
           <a:prstGeom prst="rect">
@@ -6685,7 +7269,7 @@
         </p:nvCxnSpPr>
         <p:spPr>
           <a:xfrm flipH="1" flipV="1">
-            <a:off x="7696911" y="9327665"/>
+            <a:off x="8696401" y="9327665"/>
             <a:ext cx="2491971" cy="1059913"/>
           </a:xfrm>
           <a:prstGeom prst="line">
@@ -6739,7 +7323,7 @@
         </p:nvCxnSpPr>
         <p:spPr>
           <a:xfrm>
-            <a:off x="3427762" y="8938356"/>
+            <a:off x="4427252" y="8938356"/>
             <a:ext cx="0" cy="1522386"/>
           </a:xfrm>
           <a:prstGeom prst="line">
@@ -6772,7 +7356,7 @@
         </p:nvCxnSpPr>
         <p:spPr>
           <a:xfrm flipH="1">
-            <a:off x="2119823" y="8841845"/>
+            <a:off x="3100263" y="8841845"/>
             <a:ext cx="6351" cy="1538748"/>
           </a:xfrm>
           <a:prstGeom prst="line">
@@ -6827,9 +7411,16 @@
                 <a:latin typeface="Arial" panose="020B0604020202020204" pitchFamily="34" charset="0"/>
                 <a:ea typeface="AR PL KaitiM GB" charset="0"/>
               </a:rPr>
-              <a:t>t0</a:t>
-            </a:r>
-            <a:endParaRPr lang="en-US" altLang="zh-CN" sz="2400">
+              <a:t>t</a:t>
+            </a:r>
+            <a:r>
+              <a:rPr lang="en-US" altLang="zh-CN" sz="2400" baseline="-25000">
+                <a:latin typeface="Arial" panose="020B0604020202020204" pitchFamily="34" charset="0"/>
+                <a:ea typeface="AR PL KaitiM GB" charset="0"/>
+              </a:rPr>
+              <a:t>0</a:t>
+            </a:r>
+            <a:endParaRPr lang="en-US" altLang="zh-CN" sz="2400" baseline="-25000">
               <a:latin typeface="Arial" panose="020B0604020202020204" pitchFamily="34" charset="0"/>
               <a:ea typeface="AR PL KaitiM GB" charset="0"/>
             </a:endParaRPr>
@@ -6844,7 +7435,7 @@
         </p:nvSpPr>
         <p:spPr>
           <a:xfrm>
-            <a:off x="1969314" y="10419332"/>
+            <a:off x="3034844" y="10403457"/>
             <a:ext cx="563932" cy="457200"/>
           </a:xfrm>
           <a:prstGeom prst="rect">
@@ -6866,9 +7457,16 @@
                 <a:latin typeface="Arial" panose="020B0604020202020204" pitchFamily="34" charset="0"/>
                 <a:ea typeface="AR PL KaitiM GB" charset="0"/>
               </a:rPr>
-              <a:t>t0</a:t>
-            </a:r>
-            <a:endParaRPr lang="en-US" altLang="zh-CN" sz="2400">
+              <a:t>t</a:t>
+            </a:r>
+            <a:r>
+              <a:rPr lang="en-US" altLang="zh-CN" sz="2400" baseline="-25000">
+                <a:latin typeface="Arial" panose="020B0604020202020204" pitchFamily="34" charset="0"/>
+                <a:ea typeface="AR PL KaitiM GB" charset="0"/>
+              </a:rPr>
+              <a:t>0</a:t>
+            </a:r>
+            <a:endParaRPr lang="en-US" altLang="zh-CN" sz="2400" baseline="-25000">
               <a:latin typeface="Arial" panose="020B0604020202020204" pitchFamily="34" charset="0"/>
               <a:ea typeface="AR PL KaitiM GB" charset="0"/>
             </a:endParaRPr>
@@ -6883,7 +7481,7 @@
         </p:nvSpPr>
         <p:spPr>
           <a:xfrm>
-            <a:off x="3392481" y="10412346"/>
+            <a:off x="4391971" y="10412346"/>
             <a:ext cx="563932" cy="457200"/>
           </a:xfrm>
           <a:prstGeom prst="rect">
@@ -6905,9 +7503,16 @@
                 <a:latin typeface="Arial" panose="020B0604020202020204" pitchFamily="34" charset="0"/>
                 <a:ea typeface="AR PL KaitiM GB" charset="0"/>
               </a:rPr>
-              <a:t>t1</a:t>
-            </a:r>
-            <a:endParaRPr lang="en-US" altLang="zh-CN" sz="2400">
+              <a:t>t</a:t>
+            </a:r>
+            <a:r>
+              <a:rPr lang="en-US" altLang="zh-CN" sz="2400" baseline="-25000">
+                <a:latin typeface="Arial" panose="020B0604020202020204" pitchFamily="34" charset="0"/>
+                <a:ea typeface="AR PL KaitiM GB" charset="0"/>
+              </a:rPr>
+              <a:t>1</a:t>
+            </a:r>
+            <a:endParaRPr lang="en-US" altLang="zh-CN" sz="2400" baseline="-25000">
               <a:latin typeface="Arial" panose="020B0604020202020204" pitchFamily="34" charset="0"/>
               <a:ea typeface="AR PL KaitiM GB" charset="0"/>
             </a:endParaRPr>
@@ -6922,7 +7527,7 @@
         </p:nvCxnSpPr>
         <p:spPr>
           <a:xfrm>
-            <a:off x="7665504" y="8866595"/>
+            <a:off x="8664994" y="8866595"/>
             <a:ext cx="0" cy="1522386"/>
           </a:xfrm>
           <a:prstGeom prst="line">
@@ -6955,7 +7560,7 @@
         </p:nvSpPr>
         <p:spPr>
           <a:xfrm>
-            <a:off x="3938632" y="8384603"/>
+            <a:off x="4938122" y="8384603"/>
             <a:ext cx="3689057" cy="457200"/>
           </a:xfrm>
           <a:prstGeom prst="rect">
@@ -6989,7 +7594,7 @@
         </p:nvCxnSpPr>
         <p:spPr>
           <a:xfrm flipV="1">
-            <a:off x="3509967" y="9052685"/>
+            <a:off x="4509457" y="9052685"/>
             <a:ext cx="4064377" cy="15876"/>
           </a:xfrm>
           <a:prstGeom prst="straightConnector1">
@@ -7023,7 +7628,7 @@
         </p:nvSpPr>
         <p:spPr>
           <a:xfrm>
-            <a:off x="7310795" y="10422511"/>
+            <a:off x="8310285" y="10384411"/>
             <a:ext cx="610927" cy="457200"/>
           </a:xfrm>
           <a:prstGeom prst="rect">
@@ -7045,9 +7650,16 @@
                 <a:latin typeface="Arial" panose="020B0604020202020204" pitchFamily="34" charset="0"/>
                 <a:ea typeface="AR PL KaitiM GB" charset="0"/>
               </a:rPr>
-              <a:t>t2</a:t>
-            </a:r>
-            <a:endParaRPr lang="en-US" altLang="zh-CN" sz="2400">
+              <a:t>t</a:t>
+            </a:r>
+            <a:r>
+              <a:rPr lang="en-US" altLang="zh-CN" sz="2400" baseline="-25000">
+                <a:latin typeface="Arial" panose="020B0604020202020204" pitchFamily="34" charset="0"/>
+                <a:ea typeface="AR PL KaitiM GB" charset="0"/>
+              </a:rPr>
+              <a:t>2</a:t>
+            </a:r>
+            <a:endParaRPr lang="en-US" altLang="zh-CN" sz="2400" baseline="-25000">
               <a:latin typeface="Arial" panose="020B0604020202020204" pitchFamily="34" charset="0"/>
               <a:ea typeface="AR PL KaitiM GB" charset="0"/>
             </a:endParaRPr>
@@ -7062,7 +7674,7 @@
         </p:nvSpPr>
         <p:spPr>
           <a:xfrm>
-            <a:off x="7726123" y="8481132"/>
+            <a:off x="8725613" y="8481132"/>
             <a:ext cx="3689057" cy="457200"/>
           </a:xfrm>
           <a:prstGeom prst="rect">
@@ -7109,7 +7721,7 @@
         </p:nvCxnSpPr>
         <p:spPr>
           <a:xfrm flipH="1">
-            <a:off x="10368915" y="9021445"/>
+            <a:off x="11368405" y="9021445"/>
             <a:ext cx="2540" cy="1407160"/>
           </a:xfrm>
           <a:prstGeom prst="line">
@@ -7142,7 +7754,7 @@
         </p:nvCxnSpPr>
         <p:spPr>
           <a:xfrm flipV="1">
-            <a:off x="7652385" y="9088755"/>
+            <a:off x="8651875" y="9088755"/>
             <a:ext cx="2696845" cy="12065"/>
           </a:xfrm>
           <a:prstGeom prst="straightConnector1">
@@ -7442,9 +8054,16 @@
                 <a:latin typeface="Arial" panose="020B0604020202020204" pitchFamily="34" charset="0"/>
                 <a:ea typeface="AR PL KaitiM GB" charset="0"/>
               </a:rPr>
-              <a:t>t1</a:t>
-            </a:r>
-            <a:endParaRPr lang="en-US" altLang="zh-CN" sz="2400">
+              <a:t>t</a:t>
+            </a:r>
+            <a:r>
+              <a:rPr lang="en-US" altLang="zh-CN" sz="2400" baseline="-25000">
+                <a:latin typeface="Arial" panose="020B0604020202020204" pitchFamily="34" charset="0"/>
+                <a:ea typeface="AR PL KaitiM GB" charset="0"/>
+              </a:rPr>
+              <a:t>1</a:t>
+            </a:r>
+            <a:endParaRPr lang="en-US" altLang="zh-CN" sz="2400" baseline="-25000">
               <a:latin typeface="Arial" panose="020B0604020202020204" pitchFamily="34" charset="0"/>
               <a:ea typeface="AR PL KaitiM GB" charset="0"/>
             </a:endParaRPr>
@@ -7628,9 +8247,16 @@
                 <a:latin typeface="Arial" panose="020B0604020202020204" pitchFamily="34" charset="0"/>
                 <a:ea typeface="AR PL KaitiM GB" charset="0"/>
               </a:rPr>
-              <a:t>t2</a:t>
-            </a:r>
-            <a:endParaRPr lang="en-US" altLang="zh-CN" sz="2400">
+              <a:t>t</a:t>
+            </a:r>
+            <a:r>
+              <a:rPr lang="en-US" altLang="zh-CN" sz="2400" baseline="-25000">
+                <a:latin typeface="Arial" panose="020B0604020202020204" pitchFamily="34" charset="0"/>
+                <a:ea typeface="AR PL KaitiM GB" charset="0"/>
+              </a:rPr>
+              <a:t>2</a:t>
+            </a:r>
+            <a:endParaRPr lang="en-US" altLang="zh-CN" sz="2400" baseline="-25000">
               <a:latin typeface="Arial" panose="020B0604020202020204" pitchFamily="34" charset="0"/>
               <a:ea typeface="AR PL KaitiM GB" charset="0"/>
             </a:endParaRPr>
@@ -7929,9 +8555,16 @@
                 <a:latin typeface="Arial" panose="020B0604020202020204" pitchFamily="34" charset="0"/>
                 <a:ea typeface="AR PL KaitiM GB" charset="0"/>
               </a:rPr>
-              <a:t>t3</a:t>
-            </a:r>
-            <a:endParaRPr lang="en-US" altLang="zh-CN" sz="2400">
+              <a:t>t</a:t>
+            </a:r>
+            <a:r>
+              <a:rPr lang="en-US" altLang="zh-CN" sz="2400" baseline="-25000">
+                <a:latin typeface="Arial" panose="020B0604020202020204" pitchFamily="34" charset="0"/>
+                <a:ea typeface="AR PL KaitiM GB" charset="0"/>
+              </a:rPr>
+              <a:t>3</a:t>
+            </a:r>
+            <a:endParaRPr lang="en-US" altLang="zh-CN" sz="2400" baseline="-25000">
               <a:latin typeface="Arial" panose="020B0604020202020204" pitchFamily="34" charset="0"/>
               <a:ea typeface="AR PL KaitiM GB" charset="0"/>
             </a:endParaRPr>
@@ -8621,7 +9254,7 @@
         </p:nvSpPr>
         <p:spPr>
           <a:xfrm>
-            <a:off x="10180989" y="10380333"/>
+            <a:off x="11180479" y="10380333"/>
             <a:ext cx="2311842" cy="457200"/>
           </a:xfrm>
           <a:prstGeom prst="rect">
@@ -8643,15 +9276,170 @@
                 <a:latin typeface="Arial" panose="020B0604020202020204" pitchFamily="34" charset="0"/>
                 <a:ea typeface="AR PL KaitiM GB" charset="0"/>
               </a:rPr>
-              <a:t>t3</a:t>
-            </a:r>
-            <a:endParaRPr lang="en-US" altLang="zh-CN" sz="2400">
+              <a:t>t</a:t>
+            </a:r>
+            <a:r>
+              <a:rPr lang="en-US" altLang="zh-CN" sz="2400" baseline="-25000">
+                <a:latin typeface="Arial" panose="020B0604020202020204" pitchFamily="34" charset="0"/>
+                <a:ea typeface="AR PL KaitiM GB" charset="0"/>
+              </a:rPr>
+              <a:t>3</a:t>
+            </a:r>
+            <a:endParaRPr lang="en-US" altLang="zh-CN" sz="2400" baseline="-25000">
               <a:latin typeface="Arial" panose="020B0604020202020204" pitchFamily="34" charset="0"/>
               <a:ea typeface="AR PL KaitiM GB" charset="0"/>
             </a:endParaRPr>
           </a:p>
         </p:txBody>
       </p:sp>
+      <p:sp>
+        <p:nvSpPr>
+          <p:cNvPr id="2" name="闪电形 1"/>
+          <p:cNvSpPr/>
+          <p:nvPr/>
+        </p:nvSpPr>
+        <p:spPr>
+          <a:xfrm>
+            <a:off x="404495" y="8384540"/>
+            <a:ext cx="640715" cy="1995170"/>
+          </a:xfrm>
+          <a:prstGeom prst="lightningBolt">
+            <a:avLst/>
+          </a:prstGeom>
+          <a:solidFill>
+            <a:srgbClr val="FF0000"/>
+          </a:solidFill>
+          <a:ln>
+            <a:solidFill>
+              <a:srgbClr val="FF0000"/>
+            </a:solidFill>
+          </a:ln>
+        </p:spPr>
+        <p:style>
+          <a:lnRef idx="2">
+            <a:schemeClr val="accent1">
+              <a:shade val="50000"/>
+            </a:schemeClr>
+          </a:lnRef>
+          <a:fillRef idx="1">
+            <a:schemeClr val="accent1"/>
+          </a:fillRef>
+          <a:effectRef idx="0">
+            <a:schemeClr val="accent1"/>
+          </a:effectRef>
+          <a:fontRef idx="minor">
+            <a:schemeClr val="lt1"/>
+          </a:fontRef>
+        </p:style>
+        <p:txBody>
+          <a:bodyPr rtlCol="0" anchor="ctr"/>
+          <a:p>
+            <a:pPr algn="ctr"/>
+            <a:endParaRPr lang="zh-CN" altLang="en-US"/>
+          </a:p>
+        </p:txBody>
+      </p:sp>
+      <p:sp>
+        <p:nvSpPr>
+          <p:cNvPr id="8" name="文本框 7"/>
+          <p:cNvSpPr txBox="1"/>
+          <p:nvPr/>
+        </p:nvSpPr>
+        <p:spPr>
+          <a:xfrm>
+            <a:off x="1222563" y="8841778"/>
+            <a:ext cx="1884219" cy="822960"/>
+          </a:xfrm>
+          <a:prstGeom prst="rect">
+            <a:avLst/>
+          </a:prstGeom>
+          <a:noFill/>
+        </p:spPr>
+        <p:txBody>
+          <a:bodyPr wrap="square" rtlCol="0">
+            <a:spAutoFit/>
+          </a:bodyPr>
+          <a:p>
+            <a:pPr algn="l"/>
+            <a:r>
+              <a:rPr lang="en-US" altLang="zh-CN" sz="2400">
+                <a:latin typeface="Arial" panose="020B0604020202020204" pitchFamily="34" charset="0"/>
+              </a:rPr>
+              <a:t>preparation time</a:t>
+            </a:r>
+            <a:endParaRPr lang="en-US" altLang="zh-CN" sz="2400">
+              <a:latin typeface="Arial" panose="020B0604020202020204" pitchFamily="34" charset="0"/>
+            </a:endParaRPr>
+          </a:p>
+        </p:txBody>
+      </p:sp>
+      <p:cxnSp>
+        <p:nvCxnSpPr>
+          <p:cNvPr id="3" name="直接箭头连接符 2"/>
+          <p:cNvCxnSpPr/>
+          <p:nvPr/>
+        </p:nvCxnSpPr>
+        <p:spPr>
+          <a:xfrm>
+            <a:off x="1087755" y="9624060"/>
+            <a:ext cx="2075815" cy="27940"/>
+          </a:xfrm>
+          <a:prstGeom prst="straightConnector1">
+            <a:avLst/>
+          </a:prstGeom>
+          <a:ln>
+            <a:headEnd type="arrow" w="med" len="med"/>
+            <a:tailEnd type="arrow" w="med" len="med"/>
+          </a:ln>
+        </p:spPr>
+        <p:style>
+          <a:lnRef idx="1">
+            <a:schemeClr val="dk1"/>
+          </a:lnRef>
+          <a:fillRef idx="0">
+            <a:schemeClr val="dk1"/>
+          </a:fillRef>
+          <a:effectRef idx="0">
+            <a:schemeClr val="dk1"/>
+          </a:effectRef>
+          <a:fontRef idx="minor">
+            <a:schemeClr val="tx1"/>
+          </a:fontRef>
+        </p:style>
+      </p:cxnSp>
+      <p:cxnSp>
+        <p:nvCxnSpPr>
+          <p:cNvPr id="9" name="直接连接符 8"/>
+          <p:cNvCxnSpPr/>
+          <p:nvPr/>
+        </p:nvCxnSpPr>
+        <p:spPr>
+          <a:xfrm flipH="1">
+            <a:off x="1081598" y="8841845"/>
+            <a:ext cx="6351" cy="1538748"/>
+          </a:xfrm>
+          <a:prstGeom prst="line">
+            <a:avLst/>
+          </a:prstGeom>
+          <a:ln>
+            <a:prstDash val="sysDot"/>
+          </a:ln>
+        </p:spPr>
+        <p:style>
+          <a:lnRef idx="3">
+            <a:schemeClr val="dk1"/>
+          </a:lnRef>
+          <a:fillRef idx="0">
+            <a:schemeClr val="dk1"/>
+          </a:fillRef>
+          <a:effectRef idx="2">
+            <a:schemeClr val="dk1"/>
+          </a:effectRef>
+          <a:fontRef idx="minor">
+            <a:schemeClr val="tx1"/>
+          </a:fontRef>
+        </p:style>
+      </p:cxnSp>
     </p:spTree>
   </p:cSld>
   <p:clrMapOvr>
@@ -8919,4 +9707,265 @@
     </a:ext>
   </a:extLst>
 </a:theme>
+</file>
+
+<file path=ppt/theme/theme2.xml><?xml version="1.0" encoding="utf-8"?>
+<a:theme xmlns:a="http://schemas.openxmlformats.org/drawingml/2006/main" name="Office 主题">
+  <a:themeElements>
+    <a:clrScheme name="Office">
+      <a:dk1>
+        <a:sysClr val="windowText" lastClr="000000"/>
+      </a:dk1>
+      <a:lt1>
+        <a:sysClr val="window" lastClr="FFFFFF"/>
+      </a:lt1>
+      <a:dk2>
+        <a:srgbClr val="44546A"/>
+      </a:dk2>
+      <a:lt2>
+        <a:srgbClr val="E7E6E6"/>
+      </a:lt2>
+      <a:accent1>
+        <a:srgbClr val="5B9BD5"/>
+      </a:accent1>
+      <a:accent2>
+        <a:srgbClr val="ED7D31"/>
+      </a:accent2>
+      <a:accent3>
+        <a:srgbClr val="A5A5A5"/>
+      </a:accent3>
+      <a:accent4>
+        <a:srgbClr val="FFC000"/>
+      </a:accent4>
+      <a:accent5>
+        <a:srgbClr val="4472C4"/>
+      </a:accent5>
+      <a:accent6>
+        <a:srgbClr val="70AD47"/>
+      </a:accent6>
+      <a:hlink>
+        <a:srgbClr val="0563C1"/>
+      </a:hlink>
+      <a:folHlink>
+        <a:srgbClr val="954F72"/>
+      </a:folHlink>
+    </a:clrScheme>
+    <a:fontScheme name="Office">
+      <a:majorFont>
+        <a:latin typeface="Calibri Light"/>
+        <a:ea typeface=""/>
+        <a:cs typeface=""/>
+        <a:font script="Jpan" typeface="ＭＳ Ｐゴシック"/>
+        <a:font script="Hang" typeface="맑은 고딕"/>
+        <a:font script="Hans" typeface="宋体"/>
+        <a:font script="Hant" typeface="新細明體"/>
+        <a:font script="Arab" typeface="Times New Roman"/>
+        <a:font script="Hebr" typeface="Times New Roman"/>
+        <a:font script="Thai" typeface="Angsana New"/>
+        <a:font script="Ethi" typeface="Nyala"/>
+        <a:font script="Beng" typeface="Vrinda"/>
+        <a:font script="Gujr" typeface="Shruti"/>
+        <a:font script="Khmr" typeface="MoolBoran"/>
+        <a:font script="Knda" typeface="Tunga"/>
+        <a:font script="Guru" typeface="Raavi"/>
+        <a:font script="Cans" typeface="Euphemia"/>
+        <a:font script="Cher" typeface="Plantagenet Cherokee"/>
+        <a:font script="Yiii" typeface="Microsoft Yi Baiti"/>
+        <a:font script="Tibt" typeface="Microsoft Himalaya"/>
+        <a:font script="Thaa" typeface="MV Boli"/>
+        <a:font script="Deva" typeface="Mangal"/>
+        <a:font script="Telu" typeface="Gautami"/>
+        <a:font script="Taml" typeface="Latha"/>
+        <a:font script="Syrc" typeface="Estrangelo Edessa"/>
+        <a:font script="Orya" typeface="Kalinga"/>
+        <a:font script="Mlym" typeface="Kartika"/>
+        <a:font script="Laoo" typeface="DokChampa"/>
+        <a:font script="Sinh" typeface="Iskoola Pota"/>
+        <a:font script="Mong" typeface="Mongolian Baiti"/>
+        <a:font script="Viet" typeface="Times New Roman"/>
+        <a:font script="Uigh" typeface="Microsoft Uighur"/>
+        <a:font script="Geor" typeface="Sylfaen"/>
+      </a:majorFont>
+      <a:minorFont>
+        <a:latin typeface="Calibri"/>
+        <a:ea typeface=""/>
+        <a:cs typeface=""/>
+        <a:font script="Jpan" typeface="ＭＳ Ｐゴシック"/>
+        <a:font script="Hang" typeface="맑은 고딕"/>
+        <a:font script="Hans" typeface="宋体"/>
+        <a:font script="Hant" typeface="新細明體"/>
+        <a:font script="Arab" typeface="Arial"/>
+        <a:font script="Hebr" typeface="Arial"/>
+        <a:font script="Thai" typeface="Cordia New"/>
+        <a:font script="Ethi" typeface="Nyala"/>
+        <a:font script="Beng" typeface="Vrinda"/>
+        <a:font script="Gujr" typeface="Shruti"/>
+        <a:font script="Khmr" typeface="DaunPenh"/>
+        <a:font script="Knda" typeface="Tunga"/>
+        <a:font script="Guru" typeface="Raavi"/>
+        <a:font script="Cans" typeface="Euphemia"/>
+        <a:font script="Cher" typeface="Plantagenet Cherokee"/>
+        <a:font script="Yiii" typeface="Microsoft Yi Baiti"/>
+        <a:font script="Tibt" typeface="Microsoft Himalaya"/>
+        <a:font script="Thaa" typeface="MV Boli"/>
+        <a:font script="Deva" typeface="Mangal"/>
+        <a:font script="Telu" typeface="Gautami"/>
+        <a:font script="Taml" typeface="Latha"/>
+        <a:font script="Syrc" typeface="Estrangelo Edessa"/>
+        <a:font script="Orya" typeface="Kalinga"/>
+        <a:font script="Mlym" typeface="Kartika"/>
+        <a:font script="Laoo" typeface="DokChampa"/>
+        <a:font script="Sinh" typeface="Iskoola Pota"/>
+        <a:font script="Mong" typeface="Mongolian Baiti"/>
+        <a:font script="Viet" typeface="Arial"/>
+        <a:font script="Uigh" typeface="Microsoft Uighur"/>
+        <a:font script="Geor" typeface="Sylfaen"/>
+      </a:minorFont>
+    </a:fontScheme>
+    <a:fmtScheme name="Office">
+      <a:fillStyleLst>
+        <a:solidFill>
+          <a:schemeClr val="phClr"/>
+        </a:solidFill>
+        <a:gradFill rotWithShape="1">
+          <a:gsLst>
+            <a:gs pos="0">
+              <a:schemeClr val="phClr">
+                <a:lumMod val="110000"/>
+                <a:satMod val="105000"/>
+                <a:tint val="67000"/>
+              </a:schemeClr>
+            </a:gs>
+            <a:gs pos="50000">
+              <a:schemeClr val="phClr">
+                <a:lumMod val="105000"/>
+                <a:satMod val="103000"/>
+                <a:tint val="73000"/>
+              </a:schemeClr>
+            </a:gs>
+            <a:gs pos="100000">
+              <a:schemeClr val="phClr">
+                <a:lumMod val="105000"/>
+                <a:satMod val="109000"/>
+                <a:tint val="81000"/>
+              </a:schemeClr>
+            </a:gs>
+          </a:gsLst>
+          <a:lin ang="5400000" scaled="0"/>
+        </a:gradFill>
+        <a:gradFill rotWithShape="1">
+          <a:gsLst>
+            <a:gs pos="0">
+              <a:schemeClr val="phClr">
+                <a:satMod val="103000"/>
+                <a:lumMod val="102000"/>
+                <a:tint val="94000"/>
+              </a:schemeClr>
+            </a:gs>
+            <a:gs pos="50000">
+              <a:schemeClr val="phClr">
+                <a:satMod val="110000"/>
+                <a:lumMod val="100000"/>
+                <a:shade val="100000"/>
+              </a:schemeClr>
+            </a:gs>
+            <a:gs pos="100000">
+              <a:schemeClr val="phClr">
+                <a:lumMod val="99000"/>
+                <a:satMod val="120000"/>
+                <a:shade val="78000"/>
+              </a:schemeClr>
+            </a:gs>
+          </a:gsLst>
+          <a:lin ang="5400000" scaled="0"/>
+        </a:gradFill>
+      </a:fillStyleLst>
+      <a:lnStyleLst>
+        <a:ln w="6350" cap="flat" cmpd="sng" algn="ctr">
+          <a:solidFill>
+            <a:schemeClr val="phClr"/>
+          </a:solidFill>
+          <a:prstDash val="solid"/>
+          <a:miter lim="800000"/>
+        </a:ln>
+        <a:ln w="12700" cap="flat" cmpd="sng" algn="ctr">
+          <a:solidFill>
+            <a:schemeClr val="phClr"/>
+          </a:solidFill>
+          <a:prstDash val="solid"/>
+          <a:miter lim="800000"/>
+        </a:ln>
+        <a:ln w="19050" cap="flat" cmpd="sng" algn="ctr">
+          <a:solidFill>
+            <a:schemeClr val="phClr"/>
+          </a:solidFill>
+          <a:prstDash val="solid"/>
+          <a:miter lim="800000"/>
+        </a:ln>
+      </a:lnStyleLst>
+      <a:effectStyleLst>
+        <a:effectStyle>
+          <a:effectLst/>
+        </a:effectStyle>
+        <a:effectStyle>
+          <a:effectLst/>
+        </a:effectStyle>
+        <a:effectStyle>
+          <a:effectLst>
+            <a:outerShdw blurRad="57150" dist="19050" dir="5400000" algn="ctr" rotWithShape="0">
+              <a:srgbClr val="000000">
+                <a:alpha val="63000"/>
+              </a:srgbClr>
+            </a:outerShdw>
+          </a:effectLst>
+        </a:effectStyle>
+      </a:effectStyleLst>
+      <a:bgFillStyleLst>
+        <a:solidFill>
+          <a:schemeClr val="phClr"/>
+        </a:solidFill>
+        <a:solidFill>
+          <a:schemeClr val="phClr">
+            <a:tint val="95000"/>
+            <a:satMod val="170000"/>
+          </a:schemeClr>
+        </a:solidFill>
+        <a:gradFill rotWithShape="1">
+          <a:gsLst>
+            <a:gs pos="0">
+              <a:schemeClr val="phClr">
+                <a:tint val="93000"/>
+                <a:satMod val="150000"/>
+                <a:shade val="98000"/>
+                <a:lumMod val="102000"/>
+              </a:schemeClr>
+            </a:gs>
+            <a:gs pos="50000">
+              <a:schemeClr val="phClr">
+                <a:tint val="98000"/>
+                <a:satMod val="130000"/>
+                <a:shade val="90000"/>
+                <a:lumMod val="103000"/>
+              </a:schemeClr>
+            </a:gs>
+            <a:gs pos="100000">
+              <a:schemeClr val="phClr">
+                <a:shade val="63000"/>
+                <a:satMod val="120000"/>
+              </a:schemeClr>
+            </a:gs>
+          </a:gsLst>
+          <a:lin ang="5400000" scaled="0"/>
+        </a:gradFill>
+      </a:bgFillStyleLst>
+    </a:fmtScheme>
+  </a:themeElements>
+  <a:objectDefaults/>
+  <a:extraClrSchemeLst/>
+  <a:extLst>
+    <a:ext uri="{05A4C25C-085E-4340-85A3-A5531E510DB2}">
+      <thm15:themeFamily xmlns:thm15="http://schemas.microsoft.com/office/thememl/2012/main" name="Office Theme" id="{62F939B6-93AF-4DB8-9C6B-D6C7DFDC589F}" vid="{4A3C46E8-61CC-4603-A589-7422A47A8E4A}"/>
+    </a:ext>
+  </a:extLst>
+</a:theme>
 </file>
</xml_diff>

<commit_message>
realization: WR &beam dynamic rework done
</commit_message>
<xml_diff>
--- a/images/rise_flattop_fall.pptx
+++ b/images/rise_flattop_fall.pptx
@@ -4986,8 +4986,8 @@
         </p:nvSpPr>
         <p:spPr>
           <a:xfrm>
-            <a:off x="4587602" y="7773098"/>
-            <a:ext cx="3689057" cy="457200"/>
+            <a:off x="4957172" y="7572438"/>
+            <a:ext cx="3689057" cy="822960"/>
           </a:xfrm>
           <a:prstGeom prst="rect">
             <a:avLst/>
@@ -5004,7 +5004,19 @@
               <a:rPr lang="en-US" altLang="zh-CN" sz="2400">
                 <a:latin typeface="Arial" panose="020B0604020202020204" pitchFamily="34" charset="0"/>
               </a:rPr>
-              <a:t>Flat-top ≥ length of batch</a:t>
+              <a:t>kicker flat-top ≥ </a:t>
+            </a:r>
+            <a:endParaRPr lang="en-US" altLang="zh-CN" sz="2400">
+              <a:latin typeface="Arial" panose="020B0604020202020204" pitchFamily="34" charset="0"/>
+            </a:endParaRPr>
+          </a:p>
+          <a:p>
+            <a:pPr algn="l"/>
+            <a:r>
+              <a:rPr lang="en-US" altLang="zh-CN" sz="2400">
+                <a:latin typeface="Arial" panose="020B0604020202020204" pitchFamily="34" charset="0"/>
+              </a:rPr>
+              <a:t>length of batch</a:t>
             </a:r>
             <a:endParaRPr lang="en-US" altLang="zh-CN" sz="2400">
               <a:latin typeface="Arial" panose="020B0604020202020204" pitchFamily="34" charset="0"/>
@@ -7560,8 +7572,8 @@
         </p:nvSpPr>
         <p:spPr>
           <a:xfrm>
-            <a:off x="4938122" y="8384603"/>
-            <a:ext cx="3689057" cy="457200"/>
+            <a:off x="5615667" y="8134413"/>
+            <a:ext cx="3689057" cy="822960"/>
           </a:xfrm>
           <a:prstGeom prst="rect">
             <a:avLst/>
@@ -7578,7 +7590,19 @@
               <a:rPr lang="en-US" altLang="zh-CN" sz="2400">
                 <a:latin typeface="Arial" panose="020B0604020202020204" pitchFamily="34" charset="0"/>
               </a:rPr>
-              <a:t>Flat-top ≥ length of batch</a:t>
+              <a:t>kicker flat-top ≥ </a:t>
+            </a:r>
+            <a:endParaRPr lang="en-US" altLang="zh-CN" sz="2400">
+              <a:latin typeface="Arial" panose="020B0604020202020204" pitchFamily="34" charset="0"/>
+            </a:endParaRPr>
+          </a:p>
+          <a:p>
+            <a:pPr algn="l"/>
+            <a:r>
+              <a:rPr lang="en-US" altLang="zh-CN" sz="2400">
+                <a:latin typeface="Arial" panose="020B0604020202020204" pitchFamily="34" charset="0"/>
+              </a:rPr>
+              <a:t>length of batch</a:t>
             </a:r>
             <a:endParaRPr lang="en-US" altLang="zh-CN" sz="2400">
               <a:latin typeface="Arial" panose="020B0604020202020204" pitchFamily="34" charset="0"/>

</xml_diff>